<commit_message>
Remision en modelo proceso
</commit_message>
<xml_diff>
--- a/LIQ19_Workbook_v001_20190111.pptx
+++ b/LIQ19_Workbook_v001_20190111.pptx
@@ -5089,8 +5089,8 @@
         </p:nvCxnSpPr>
         <p:spPr>
           <a:xfrm rot="16200000" flipH="1">
-            <a:off x="1556962" y="3879040"/>
-            <a:ext cx="1637846" cy="12039"/>
+            <a:off x="1989384" y="2942664"/>
+            <a:ext cx="703111" cy="70469"/>
           </a:xfrm>
           <a:prstGeom prst="bentConnector3">
             <a:avLst>
@@ -5124,7 +5124,7 @@
         </p:nvGrpSpPr>
         <p:grpSpPr>
           <a:xfrm>
-            <a:off x="3915497" y="3713383"/>
+            <a:off x="3879112" y="3713383"/>
             <a:ext cx="1291110" cy="789606"/>
             <a:chOff x="3286372" y="3171183"/>
             <a:chExt cx="1291110" cy="789606"/>
@@ -5318,7 +5318,7 @@
         </p:nvGrpSpPr>
         <p:grpSpPr>
           <a:xfrm>
-            <a:off x="1740561" y="2307077"/>
+            <a:off x="1676400" y="1867284"/>
             <a:ext cx="1258610" cy="759060"/>
             <a:chOff x="839605" y="2147624"/>
             <a:chExt cx="1258610" cy="759060"/>
@@ -5618,68 +5618,6 @@
           </p:spPr>
         </p:pic>
       </p:grpSp>
-      <p:sp>
-        <p:nvSpPr>
-          <p:cNvPr id="6" name="Rectángulo 5"/>
-          <p:cNvSpPr/>
-          <p:nvPr/>
-        </p:nvSpPr>
-        <p:spPr>
-          <a:xfrm rot="16200000">
-            <a:off x="1690698" y="3832483"/>
-            <a:ext cx="901208" cy="261610"/>
-          </a:xfrm>
-          <a:prstGeom prst="rect">
-            <a:avLst/>
-          </a:prstGeom>
-        </p:spPr>
-        <p:txBody>
-          <a:bodyPr wrap="none">
-            <a:spAutoFit/>
-          </a:bodyPr>
-          <a:lstStyle/>
-          <a:p>
-            <a:pPr algn="r"/>
-            <a:r>
-              <a:rPr lang="en-US" sz="1100" b="1" i="1" dirty="0">
-                <a:solidFill>
-                  <a:schemeClr val="bg1">
-                    <a:lumMod val="65000"/>
-                  </a:schemeClr>
-                </a:solidFill>
-              </a:rPr>
-              <a:t>[1] </a:t>
-            </a:r>
-            <a:r>
-              <a:rPr lang="en-US" sz="1100" i="1" dirty="0" err="1" smtClean="0">
-                <a:solidFill>
-                  <a:schemeClr val="bg1">
-                    <a:lumMod val="65000"/>
-                  </a:schemeClr>
-                </a:solidFill>
-              </a:rPr>
-              <a:t>Remis</a:t>
-            </a:r>
-            <a:r>
-              <a:rPr lang="es-MX" sz="1100" i="1" dirty="0" err="1" smtClean="0">
-                <a:solidFill>
-                  <a:schemeClr val="bg1">
-                    <a:lumMod val="65000"/>
-                  </a:schemeClr>
-                </a:solidFill>
-              </a:rPr>
-              <a:t>ión</a:t>
-            </a:r>
-            <a:endParaRPr lang="es-MX" sz="1100" b="1" dirty="0">
-              <a:solidFill>
-                <a:schemeClr val="bg1">
-                  <a:lumMod val="65000"/>
-                </a:schemeClr>
-              </a:solidFill>
-            </a:endParaRPr>
-          </a:p>
-        </p:txBody>
-      </p:sp>
       <p:cxnSp>
         <p:nvCxnSpPr>
           <p:cNvPr id="71" name="Conector angular 70"/>
@@ -5692,7 +5630,7 @@
         <p:spPr>
           <a:xfrm flipV="1">
             <a:off x="3011210" y="4400549"/>
-            <a:ext cx="904287" cy="1249612"/>
+            <a:ext cx="867902" cy="1249612"/>
           </a:xfrm>
           <a:prstGeom prst="bentConnector3">
             <a:avLst>
@@ -5726,7 +5664,7 @@
         </p:nvGrpSpPr>
         <p:grpSpPr>
           <a:xfrm>
-            <a:off x="6125297" y="2920126"/>
+            <a:off x="6088912" y="2920126"/>
             <a:ext cx="1293815" cy="492740"/>
             <a:chOff x="771635" y="5092449"/>
             <a:chExt cx="1293815" cy="492740"/>
@@ -6011,7 +5949,7 @@
         </p:blipFill>
         <p:spPr>
           <a:xfrm>
-            <a:off x="6589585" y="3987999"/>
+            <a:off x="6553200" y="3987999"/>
             <a:ext cx="536087" cy="477523"/>
           </a:xfrm>
           <a:prstGeom prst="rect">
@@ -6027,7 +5965,7 @@
         </p:nvGrpSpPr>
         <p:grpSpPr>
           <a:xfrm>
-            <a:off x="3970380" y="5111950"/>
+            <a:off x="3933995" y="5111950"/>
             <a:ext cx="1185217" cy="838202"/>
             <a:chOff x="3691672" y="3353080"/>
             <a:chExt cx="1544851" cy="967697"/>
@@ -6239,7 +6177,7 @@
         </p:nvCxnSpPr>
         <p:spPr>
           <a:xfrm rot="5400000">
-            <a:off x="4264965" y="4656912"/>
+            <a:off x="4228580" y="4656912"/>
             <a:ext cx="450011" cy="142165"/>
           </a:xfrm>
           <a:prstGeom prst="bentConnector3">
@@ -6455,7 +6393,7 @@
         </p:nvCxnSpPr>
         <p:spPr>
           <a:xfrm flipV="1">
-            <a:off x="5206607" y="4251294"/>
+            <a:off x="5170222" y="4251294"/>
             <a:ext cx="901776" cy="149255"/>
           </a:xfrm>
           <a:prstGeom prst="bentConnector3">
@@ -6647,8 +6585,240 @@
         </p:nvCxnSpPr>
         <p:spPr>
           <a:xfrm>
-            <a:off x="5206607" y="4400549"/>
+            <a:off x="5170222" y="4400549"/>
             <a:ext cx="918566" cy="913034"/>
+          </a:xfrm>
+          <a:prstGeom prst="bentConnector3">
+            <a:avLst>
+              <a:gd name="adj1" fmla="val 50000"/>
+            </a:avLst>
+          </a:prstGeom>
+          <a:ln>
+            <a:tailEnd type="triangle"/>
+          </a:ln>
+        </p:spPr>
+        <p:style>
+          <a:lnRef idx="2">
+            <a:schemeClr val="accent1"/>
+          </a:lnRef>
+          <a:fillRef idx="0">
+            <a:schemeClr val="accent1"/>
+          </a:fillRef>
+          <a:effectRef idx="1">
+            <a:schemeClr val="accent1"/>
+          </a:effectRef>
+          <a:fontRef idx="minor">
+            <a:schemeClr val="tx1"/>
+          </a:fontRef>
+        </p:style>
+      </p:cxnSp>
+      <p:grpSp>
+        <p:nvGrpSpPr>
+          <p:cNvPr id="33" name="Grupo 32"/>
+          <p:cNvGrpSpPr/>
+          <p:nvPr/>
+        </p:nvGrpSpPr>
+        <p:grpSpPr>
+          <a:xfrm>
+            <a:off x="1710668" y="3412866"/>
+            <a:ext cx="1258610" cy="822662"/>
+            <a:chOff x="1741672" y="3599070"/>
+            <a:chExt cx="1258610" cy="822662"/>
+          </a:xfrm>
+        </p:grpSpPr>
+        <p:pic>
+          <p:nvPicPr>
+            <p:cNvPr id="100" name="Imagen 99"/>
+            <p:cNvPicPr>
+              <a:picLocks noChangeAspect="1"/>
+            </p:cNvPicPr>
+            <p:nvPr/>
+          </p:nvPicPr>
+          <p:blipFill>
+            <a:blip r:embed="rId11"/>
+            <a:stretch>
+              <a:fillRect/>
+            </a:stretch>
+          </p:blipFill>
+          <p:spPr>
+            <a:xfrm>
+              <a:off x="2237991" y="3599070"/>
+              <a:ext cx="400824" cy="507371"/>
+            </a:xfrm>
+            <a:prstGeom prst="rect">
+              <a:avLst/>
+            </a:prstGeom>
+          </p:spPr>
+        </p:pic>
+        <p:sp>
+          <p:nvSpPr>
+            <p:cNvPr id="101" name="Rectangle 99"/>
+            <p:cNvSpPr/>
+            <p:nvPr/>
+          </p:nvSpPr>
+          <p:spPr>
+            <a:xfrm>
+              <a:off x="1741672" y="4128828"/>
+              <a:ext cx="1258610" cy="292904"/>
+            </a:xfrm>
+            <a:prstGeom prst="rect">
+              <a:avLst/>
+            </a:prstGeom>
+            <a:solidFill>
+              <a:schemeClr val="bg1"/>
+            </a:solidFill>
+            <a:ln w="28575">
+              <a:solidFill>
+                <a:srgbClr val="0070C0"/>
+              </a:solidFill>
+              <a:prstDash val="solid"/>
+            </a:ln>
+          </p:spPr>
+          <p:style>
+            <a:lnRef idx="2">
+              <a:schemeClr val="accent1">
+                <a:shade val="50000"/>
+              </a:schemeClr>
+            </a:lnRef>
+            <a:fillRef idx="1">
+              <a:schemeClr val="accent1"/>
+            </a:fillRef>
+            <a:effectRef idx="0">
+              <a:schemeClr val="accent1"/>
+            </a:effectRef>
+            <a:fontRef idx="minor">
+              <a:schemeClr val="lt1"/>
+            </a:fontRef>
+          </p:style>
+          <p:txBody>
+            <a:bodyPr rtlCol="0" anchor="ctr"/>
+            <a:lstStyle>
+              <a:defPPr>
+                <a:defRPr lang="en-US"/>
+              </a:defPPr>
+              <a:lvl1pPr marL="0" algn="l" defTabSz="914400" rtl="0" eaLnBrk="1" latinLnBrk="0" hangingPunct="1">
+                <a:defRPr sz="1800" kern="1200">
+                  <a:solidFill>
+                    <a:schemeClr val="lt1"/>
+                  </a:solidFill>
+                  <a:latin typeface="+mn-lt"/>
+                  <a:ea typeface="+mn-ea"/>
+                  <a:cs typeface="+mn-cs"/>
+                </a:defRPr>
+              </a:lvl1pPr>
+              <a:lvl2pPr marL="457200" algn="l" defTabSz="914400" rtl="0" eaLnBrk="1" latinLnBrk="0" hangingPunct="1">
+                <a:defRPr sz="1800" kern="1200">
+                  <a:solidFill>
+                    <a:schemeClr val="lt1"/>
+                  </a:solidFill>
+                  <a:latin typeface="+mn-lt"/>
+                  <a:ea typeface="+mn-ea"/>
+                  <a:cs typeface="+mn-cs"/>
+                </a:defRPr>
+              </a:lvl2pPr>
+              <a:lvl3pPr marL="914400" algn="l" defTabSz="914400" rtl="0" eaLnBrk="1" latinLnBrk="0" hangingPunct="1">
+                <a:defRPr sz="1800" kern="1200">
+                  <a:solidFill>
+                    <a:schemeClr val="lt1"/>
+                  </a:solidFill>
+                  <a:latin typeface="+mn-lt"/>
+                  <a:ea typeface="+mn-ea"/>
+                  <a:cs typeface="+mn-cs"/>
+                </a:defRPr>
+              </a:lvl3pPr>
+              <a:lvl4pPr marL="1371600" algn="l" defTabSz="914400" rtl="0" eaLnBrk="1" latinLnBrk="0" hangingPunct="1">
+                <a:defRPr sz="1800" kern="1200">
+                  <a:solidFill>
+                    <a:schemeClr val="lt1"/>
+                  </a:solidFill>
+                  <a:latin typeface="+mn-lt"/>
+                  <a:ea typeface="+mn-ea"/>
+                  <a:cs typeface="+mn-cs"/>
+                </a:defRPr>
+              </a:lvl4pPr>
+              <a:lvl5pPr marL="1828800" algn="l" defTabSz="914400" rtl="0" eaLnBrk="1" latinLnBrk="0" hangingPunct="1">
+                <a:defRPr sz="1800" kern="1200">
+                  <a:solidFill>
+                    <a:schemeClr val="lt1"/>
+                  </a:solidFill>
+                  <a:latin typeface="+mn-lt"/>
+                  <a:ea typeface="+mn-ea"/>
+                  <a:cs typeface="+mn-cs"/>
+                </a:defRPr>
+              </a:lvl5pPr>
+              <a:lvl6pPr marL="2286000" algn="l" defTabSz="914400" rtl="0" eaLnBrk="1" latinLnBrk="0" hangingPunct="1">
+                <a:defRPr sz="1800" kern="1200">
+                  <a:solidFill>
+                    <a:schemeClr val="lt1"/>
+                  </a:solidFill>
+                  <a:latin typeface="+mn-lt"/>
+                  <a:ea typeface="+mn-ea"/>
+                  <a:cs typeface="+mn-cs"/>
+                </a:defRPr>
+              </a:lvl6pPr>
+              <a:lvl7pPr marL="2743200" algn="l" defTabSz="914400" rtl="0" eaLnBrk="1" latinLnBrk="0" hangingPunct="1">
+                <a:defRPr sz="1800" kern="1200">
+                  <a:solidFill>
+                    <a:schemeClr val="lt1"/>
+                  </a:solidFill>
+                  <a:latin typeface="+mn-lt"/>
+                  <a:ea typeface="+mn-ea"/>
+                  <a:cs typeface="+mn-cs"/>
+                </a:defRPr>
+              </a:lvl7pPr>
+              <a:lvl8pPr marL="3200400" algn="l" defTabSz="914400" rtl="0" eaLnBrk="1" latinLnBrk="0" hangingPunct="1">
+                <a:defRPr sz="1800" kern="1200">
+                  <a:solidFill>
+                    <a:schemeClr val="lt1"/>
+                  </a:solidFill>
+                  <a:latin typeface="+mn-lt"/>
+                  <a:ea typeface="+mn-ea"/>
+                  <a:cs typeface="+mn-cs"/>
+                </a:defRPr>
+              </a:lvl8pPr>
+              <a:lvl9pPr marL="3657600" algn="l" defTabSz="914400" rtl="0" eaLnBrk="1" latinLnBrk="0" hangingPunct="1">
+                <a:defRPr sz="1800" kern="1200">
+                  <a:solidFill>
+                    <a:schemeClr val="lt1"/>
+                  </a:solidFill>
+                  <a:latin typeface="+mn-lt"/>
+                  <a:ea typeface="+mn-ea"/>
+                  <a:cs typeface="+mn-cs"/>
+                </a:defRPr>
+              </a:lvl9pPr>
+            </a:lstStyle>
+            <a:p>
+              <a:pPr algn="ctr"/>
+              <a:r>
+                <a:rPr lang="en-US" sz="1000" b="1" dirty="0" smtClean="0">
+                  <a:solidFill>
+                    <a:schemeClr val="tx1"/>
+                  </a:solidFill>
+                </a:rPr>
+                <a:t>REMISION</a:t>
+              </a:r>
+              <a:endParaRPr lang="es-MX" sz="1000" b="1" dirty="0" smtClean="0">
+                <a:solidFill>
+                  <a:schemeClr val="tx1"/>
+                </a:solidFill>
+              </a:endParaRPr>
+            </a:p>
+          </p:txBody>
+        </p:sp>
+      </p:grpSp>
+      <p:cxnSp>
+        <p:nvCxnSpPr>
+          <p:cNvPr id="104" name="Conector angular 103"/>
+          <p:cNvCxnSpPr>
+            <a:stCxn id="101" idx="2"/>
+            <a:endCxn id="103" idx="0"/>
+          </p:cNvCxnSpPr>
+          <p:nvPr/>
+        </p:nvCxnSpPr>
+        <p:spPr>
+          <a:xfrm rot="16200000" flipH="1">
+            <a:off x="2093636" y="4481864"/>
+            <a:ext cx="565072" cy="72399"/>
           </a:xfrm>
           <a:prstGeom prst="bentConnector3">
             <a:avLst>

</xml_diff>